<commit_message>
Last fixes & Good night!
</commit_message>
<xml_diff>
--- a/Firefox OS.pptx
+++ b/Firefox OS.pptx
@@ -7114,15 +7114,15 @@
           <a:lstStyle/>
           <a:p>
             <a:r>
-              <a:rPr lang="en-US" b="1" dirty="0" smtClean="0"/>
-              <a:t>Prepared by</a:t>
-            </a:r>
-            <a:r>
-              <a:rPr lang="en-US" b="1" dirty="0" smtClean="0"/>
-              <a:t>:</a:t>
-            </a:r>
-            <a:r>
-              <a:rPr lang="bg-BG" b="1" dirty="0" smtClean="0"/>
+              <a:rPr lang="en-US" b="1" smtClean="0"/>
+              <a:t>Prepared </a:t>
+            </a:r>
+            <a:r>
+              <a:rPr lang="en-US" b="1" smtClean="0"/>
+              <a:t>by</a:t>
+            </a:r>
+            <a:r>
+              <a:rPr lang="bg-BG" b="1" smtClean="0"/>
               <a:t>:</a:t>
             </a:r>
             <a:endParaRPr lang="bg-BG" dirty="0" smtClean="0"/>

</xml_diff>